<commit_message>
Andamento Escrita do Trabalho
</commit_message>
<xml_diff>
--- a/Figuras/Quadro Resumo do Projetos.pptx
+++ b/Figuras/Quadro Resumo do Projetos.pptx
@@ -107,6 +107,11 @@
       </a:defRPr>
     </a:lvl9pPr>
   </p:defaultTextStyle>
+  <p:extLst>
+    <p:ext uri="{EFAFB233-063F-42B5-8137-9DF3F51BA10A}">
+      <p15:sldGuideLst xmlns:p15="http://schemas.microsoft.com/office/powerpoint/2012/main"/>
+    </p:ext>
+  </p:extLst>
 </p:presentation>
 </file>
 
@@ -5816,7 +5821,7 @@
         <p:spPr>
           <a:xfrm>
             <a:off x="174644" y="2274555"/>
-            <a:ext cx="5552883" cy="2123658"/>
+            <a:ext cx="5552883" cy="2308324"/>
           </a:xfrm>
           <a:prstGeom prst="rect">
             <a:avLst/>
@@ -5851,14 +5856,18 @@
                   </a:schemeClr>
                 </a:solidFill>
               </a:rPr>
-              <a:t>: Predição de quantidade de público em jogos do Campeonato Brasileiro de Futebol</a:t>
-            </a:r>
-          </a:p>
-          <a:p>
-            <a:pPr marL="285750" indent="-285750">
-              <a:buFontTx/>
-              <a:buChar char="-"/>
-            </a:pPr>
+              <a:t>: Predição de quantidade de público em jogos do Campeonato Brasileiro de </a:t>
+            </a:r>
+            <a:r>
+              <a:rPr lang="pt-BR" sz="1200" dirty="0" smtClean="0">
+                <a:solidFill>
+                  <a:schemeClr val="accent5">
+                    <a:lumMod val="50000"/>
+                  </a:schemeClr>
+                </a:solidFill>
+              </a:rPr>
+              <a:t>Futebol.</a:t>
+            </a:r>
             <a:endParaRPr lang="pt-BR" sz="1200" dirty="0">
               <a:solidFill>
                 <a:schemeClr val="accent5">
@@ -5890,14 +5899,18 @@
                   </a:schemeClr>
                 </a:solidFill>
               </a:rPr>
-              <a:t>: Tomada de decisão em questões da logística envolvida no evento, bem como em estratégias de marketing a serem realizadas</a:t>
-            </a:r>
-          </a:p>
-          <a:p>
-            <a:pPr marL="285750" indent="-285750">
-              <a:buFontTx/>
-              <a:buChar char="-"/>
-            </a:pPr>
+              <a:t>: Tomada de decisão em questões da logística envolvida no evento, bem como em estratégias de marketing a serem </a:t>
+            </a:r>
+            <a:r>
+              <a:rPr lang="pt-BR" sz="1200" dirty="0" smtClean="0">
+                <a:solidFill>
+                  <a:schemeClr val="accent5">
+                    <a:lumMod val="50000"/>
+                  </a:schemeClr>
+                </a:solidFill>
+              </a:rPr>
+              <a:t>realizadas.</a:t>
+            </a:r>
             <a:endParaRPr lang="pt-BR" sz="1200" dirty="0">
               <a:solidFill>
                 <a:schemeClr val="accent5">
@@ -5929,14 +5942,18 @@
                   </a:schemeClr>
                 </a:solidFill>
               </a:rPr>
-              <a:t>: Etapa do Campeonato, Desempenho geral do time mandante, Importância do clube visitante, Desempenho recente do clube mandante, Dia da semana do jogo, Período do ano </a:t>
-            </a:r>
-          </a:p>
-          <a:p>
-            <a:pPr marL="285750" indent="-285750">
-              <a:buFontTx/>
-              <a:buChar char="-"/>
-            </a:pPr>
+              <a:t>: Etapa do Campeonato, Desempenho geral do time mandante, Importância do clube visitante, Desempenho recente do clube mandante, Dia da semana do jogo, Período do </a:t>
+            </a:r>
+            <a:r>
+              <a:rPr lang="pt-BR" sz="1200" dirty="0" smtClean="0">
+                <a:solidFill>
+                  <a:schemeClr val="accent5">
+                    <a:lumMod val="50000"/>
+                  </a:schemeClr>
+                </a:solidFill>
+              </a:rPr>
+              <a:t>ano.</a:t>
+            </a:r>
             <a:endParaRPr lang="pt-BR" sz="1200" dirty="0" smtClean="0">
               <a:solidFill>
                 <a:schemeClr val="accent5">
@@ -5968,7 +5985,63 @@
                   </a:schemeClr>
                 </a:solidFill>
               </a:rPr>
-              <a:t>: Aprendizado Supervisionado com Regressão</a:t>
+              <a:t>: Aprendizado Supervisionado com </a:t>
+            </a:r>
+            <a:r>
+              <a:rPr lang="pt-BR" sz="1200" dirty="0" smtClean="0">
+                <a:solidFill>
+                  <a:schemeClr val="accent5">
+                    <a:lumMod val="50000"/>
+                  </a:schemeClr>
+                </a:solidFill>
+              </a:rPr>
+              <a:t>Regressão.</a:t>
+            </a:r>
+          </a:p>
+          <a:p>
+            <a:pPr marL="285750" indent="-285750">
+              <a:buFontTx/>
+              <a:buChar char="-"/>
+            </a:pPr>
+            <a:r>
+              <a:rPr lang="pt-BR" sz="1200" b="1" dirty="0" smtClean="0">
+                <a:solidFill>
+                  <a:schemeClr val="accent5">
+                    <a:lumMod val="50000"/>
+                  </a:schemeClr>
+                </a:solidFill>
+              </a:rPr>
+              <a:t>Escopo</a:t>
+            </a:r>
+            <a:r>
+              <a:rPr lang="pt-BR" sz="1200" dirty="0">
+                <a:solidFill>
+                  <a:schemeClr val="accent5">
+                    <a:lumMod val="50000"/>
+                  </a:schemeClr>
+                </a:solidFill>
+              </a:rPr>
+              <a:t>: </a:t>
+            </a:r>
+            <a:r>
+              <a:rPr lang="pt-BR" sz="1200" dirty="0" smtClean="0">
+                <a:solidFill>
+                  <a:schemeClr val="accent5">
+                    <a:lumMod val="50000"/>
+                  </a:schemeClr>
+                </a:solidFill>
+              </a:rPr>
+              <a:t>o escopo do projeto restringe-se </a:t>
+            </a:r>
+            <a:r>
+              <a:rPr lang="pt-BR" sz="1200" dirty="0">
+                <a:solidFill>
+                  <a:schemeClr val="accent5">
+                    <a:lumMod val="50000"/>
+                  </a:schemeClr>
+                </a:solidFill>
+              </a:rPr>
+              <a:t>somente o campeonato brasileiro de futebol, que caracteriza-se por ser um campeonato de “pontos corridos”, onde não existem jogos eliminatórios. O desempenho de um clube se define pela quantidade de pontos conquistados durante todo o campeonato.</a:t>
             </a:r>
             <a:endParaRPr lang="pt-BR" sz="1200" dirty="0">
               <a:solidFill>
@@ -6492,7 +6565,7 @@
         <p:spPr>
           <a:xfrm>
             <a:off x="5804795" y="2274555"/>
-            <a:ext cx="5559498" cy="2077492"/>
+            <a:ext cx="5559498" cy="2062103"/>
           </a:xfrm>
           <a:prstGeom prst="rect">
             <a:avLst/>
@@ -6527,7 +6600,17 @@
                   </a:schemeClr>
                 </a:solidFill>
               </a:rPr>
-              <a:t>:                                                                   </a:t>
+              <a:t>: </a:t>
+            </a:r>
+            <a:r>
+              <a:rPr lang="pt-BR" sz="1200" dirty="0" smtClean="0">
+                <a:solidFill>
+                  <a:schemeClr val="accent5">
+                    <a:lumMod val="50000"/>
+                  </a:schemeClr>
+                </a:solidFill>
+              </a:rPr>
+              <a:t>                                                                                                        </a:t>
             </a:r>
             <a:r>
               <a:rPr lang="pt-BR" sz="1200" b="1" dirty="0" smtClean="0">
@@ -6537,7 +6620,17 @@
                   </a:schemeClr>
                 </a:solidFill>
               </a:rPr>
-              <a:t>Jogos de 29/03/2003 a 26/10/2023: </a:t>
+              <a:t>Jogos </a:t>
+            </a:r>
+            <a:r>
+              <a:rPr lang="pt-BR" sz="1200" b="1" dirty="0" smtClean="0">
+                <a:solidFill>
+                  <a:schemeClr val="accent5">
+                    <a:lumMod val="50000"/>
+                  </a:schemeClr>
+                </a:solidFill>
+              </a:rPr>
+              <a:t>de 29/03/2003 a 26/10/2023: </a:t>
             </a:r>
             <a:r>
               <a:rPr lang="pt-BR" sz="1100" dirty="0" smtClean="0">
@@ -6648,25 +6741,8 @@
                   </a:schemeClr>
                 </a:solidFill>
               </a:rPr>
-              <a:t>       Arquivo: brasileirao_serie_a_dados</a:t>
-            </a:r>
-            <a:r>
-              <a:rPr lang="pt-BR" sz="1100" dirty="0" smtClean="0">
-                <a:solidFill>
-                  <a:schemeClr val="accent5">
-                    <a:lumMod val="50000"/>
-                  </a:schemeClr>
-                </a:solidFill>
-              </a:rPr>
-              <a:t>_complementares_2023.csv</a:t>
-            </a:r>
-            <a:endParaRPr lang="pt-BR" sz="1100" dirty="0" smtClean="0">
-              <a:solidFill>
-                <a:schemeClr val="accent5">
-                  <a:lumMod val="50000"/>
-                </a:schemeClr>
-              </a:solidFill>
-            </a:endParaRPr>
+              <a:t>       Arquivo: brasileirao_serie_a_dados_complementares_2023.csv</a:t>
+            </a:r>
           </a:p>
           <a:p>
             <a:pPr marL="285750" indent="-285750">
@@ -6691,7 +6767,27 @@
                   </a:schemeClr>
                 </a:solidFill>
               </a:rPr>
-              <a:t>:                                                                    - Livre exploração dos </a:t>
+              <a:t>:  </a:t>
+            </a:r>
+            <a:r>
+              <a:rPr lang="pt-BR" sz="1200" dirty="0" smtClean="0">
+                <a:solidFill>
+                  <a:schemeClr val="accent5">
+                    <a:lumMod val="50000"/>
+                  </a:schemeClr>
+                </a:solidFill>
+              </a:rPr>
+              <a:t>Livre </a:t>
+            </a:r>
+            <a:r>
+              <a:rPr lang="pt-BR" sz="1200" dirty="0" smtClean="0">
+                <a:solidFill>
+                  <a:schemeClr val="accent5">
+                    <a:lumMod val="50000"/>
+                  </a:schemeClr>
+                </a:solidFill>
+              </a:rPr>
+              <a:t>exploração dos </a:t>
             </a:r>
             <a:r>
               <a:rPr lang="pt-BR" sz="1200" dirty="0" err="1" smtClean="0">
@@ -6711,7 +6807,77 @@
                   </a:schemeClr>
                 </a:solidFill>
               </a:rPr>
-              <a:t>                                                  - Conhecimento da estrutura (atributos e tipo de dados)          - Exploração visual dos dados                                                    - Estatística descritiva e tabelas de frequência dos atributos - Identificação inicial de dados inconsistentes, valores nulos e </a:t>
+              <a:t>, conhecimento </a:t>
+            </a:r>
+            <a:r>
+              <a:rPr lang="pt-BR" sz="1200" dirty="0" smtClean="0">
+                <a:solidFill>
+                  <a:schemeClr val="accent5">
+                    <a:lumMod val="50000"/>
+                  </a:schemeClr>
+                </a:solidFill>
+              </a:rPr>
+              <a:t>da estrutura (atributos e tipo de dados</a:t>
+            </a:r>
+            <a:r>
+              <a:rPr lang="pt-BR" sz="1200" dirty="0" smtClean="0">
+                <a:solidFill>
+                  <a:schemeClr val="accent5">
+                    <a:lumMod val="50000"/>
+                  </a:schemeClr>
+                </a:solidFill>
+              </a:rPr>
+              <a:t>), Exploração </a:t>
+            </a:r>
+            <a:r>
+              <a:rPr lang="pt-BR" sz="1200" dirty="0" smtClean="0">
+                <a:solidFill>
+                  <a:schemeClr val="accent5">
+                    <a:lumMod val="50000"/>
+                  </a:schemeClr>
+                </a:solidFill>
+              </a:rPr>
+              <a:t>visual dos </a:t>
+            </a:r>
+            <a:r>
+              <a:rPr lang="pt-BR" sz="1200" dirty="0" smtClean="0">
+                <a:solidFill>
+                  <a:schemeClr val="accent5">
+                    <a:lumMod val="50000"/>
+                  </a:schemeClr>
+                </a:solidFill>
+              </a:rPr>
+              <a:t>dados, estatística </a:t>
+            </a:r>
+            <a:r>
+              <a:rPr lang="pt-BR" sz="1200" dirty="0" smtClean="0">
+                <a:solidFill>
+                  <a:schemeClr val="accent5">
+                    <a:lumMod val="50000"/>
+                  </a:schemeClr>
+                </a:solidFill>
+              </a:rPr>
+              <a:t>descritiva e tabelas de frequência dos </a:t>
+            </a:r>
+            <a:r>
+              <a:rPr lang="pt-BR" sz="1200" dirty="0" smtClean="0">
+                <a:solidFill>
+                  <a:schemeClr val="accent5">
+                    <a:lumMod val="50000"/>
+                  </a:schemeClr>
+                </a:solidFill>
+              </a:rPr>
+              <a:t>atributos, identificação </a:t>
+            </a:r>
+            <a:r>
+              <a:rPr lang="pt-BR" sz="1200" dirty="0" smtClean="0">
+                <a:solidFill>
+                  <a:schemeClr val="accent5">
+                    <a:lumMod val="50000"/>
+                  </a:schemeClr>
+                </a:solidFill>
+              </a:rPr>
+              <a:t>inicial de dados inconsistentes, valores nulos e </a:t>
             </a:r>
             <a:r>
               <a:rPr lang="pt-BR" sz="1200" dirty="0" err="1" smtClean="0">
@@ -6722,6 +6888,16 @@
                 </a:solidFill>
               </a:rPr>
               <a:t>outliers</a:t>
+            </a:r>
+            <a:r>
+              <a:rPr lang="pt-BR" sz="1200" dirty="0" smtClean="0">
+                <a:solidFill>
+                  <a:schemeClr val="accent5">
+                    <a:lumMod val="50000"/>
+                  </a:schemeClr>
+                </a:solidFill>
+              </a:rPr>
+              <a:t>.</a:t>
             </a:r>
             <a:endParaRPr lang="pt-BR" sz="1200" dirty="0">
               <a:solidFill>
@@ -6816,8 +6992,8 @@
         </p:blipFill>
         <p:spPr>
           <a:xfrm>
-            <a:off x="7057783" y="4377384"/>
-            <a:ext cx="1999099" cy="1304613"/>
+            <a:off x="6877528" y="4370761"/>
+            <a:ext cx="1953491" cy="1274849"/>
           </a:xfrm>
           <a:prstGeom prst="rect">
             <a:avLst/>
@@ -6846,7 +7022,7 @@
         </p:blipFill>
         <p:spPr>
           <a:xfrm>
-            <a:off x="6164795" y="4672561"/>
+            <a:off x="6068083" y="4672561"/>
             <a:ext cx="729673" cy="714257"/>
           </a:xfrm>
           <a:prstGeom prst="rect">
@@ -6876,8 +7052,8 @@
         </p:blipFill>
         <p:spPr>
           <a:xfrm>
-            <a:off x="9220197" y="4507472"/>
-            <a:ext cx="2068191" cy="1029805"/>
+            <a:off x="8900658" y="4448531"/>
+            <a:ext cx="2358863" cy="1174538"/>
           </a:xfrm>
           <a:prstGeom prst="rect">
             <a:avLst/>
@@ -7042,17 +7218,7 @@
                   </a:schemeClr>
                 </a:solidFill>
               </a:rPr>
-              <a:t> por seleção de atributos. Deixamos na base somente os 12 atributos relevantes para o nosso problema;</a:t>
-            </a:r>
-            <a:r>
-              <a:rPr lang="pt-BR" sz="1200" dirty="0" smtClean="0">
-                <a:solidFill>
-                  <a:schemeClr val="accent5">
-                    <a:lumMod val="50000"/>
-                  </a:schemeClr>
-                </a:solidFill>
-              </a:rPr>
-              <a:t> Uniformização dos nomes dos clubes, ajuste do tipo de dado do atributo </a:t>
+              <a:t> por seleção de atributos. Deixamos na base somente os 12 atributos relevantes para o nosso problema; Uniformização dos nomes dos clubes, ajuste do tipo de dado do atributo </a:t>
             </a:r>
             <a:r>
               <a:rPr lang="pt-BR" sz="1200" b="1" dirty="0" smtClean="0">
@@ -7062,7 +7228,7 @@
                   </a:schemeClr>
                 </a:solidFill>
               </a:rPr>
-              <a:t>data</a:t>
+              <a:t>data.</a:t>
             </a:r>
             <a:endParaRPr lang="pt-BR" sz="1200" b="1" dirty="0">
               <a:solidFill>
@@ -7095,8 +7261,25 @@
                   </a:schemeClr>
                 </a:solidFill>
               </a:rPr>
-              <a:t>preenchimento dos nulos nos atributos de valor de equipe com as médias por ano, exclusão de linhas onde não foi possível estimar o valor para preenchimento</a:t>
-            </a:r>
+              <a:t>preenchimento dos nulos nos atributos de valor de equipe com as médias por ano, exclusão de linhas onde não foi possível estimar o valor para </a:t>
+            </a:r>
+            <a:r>
+              <a:rPr lang="pt-BR" sz="1200" dirty="0" smtClean="0">
+                <a:solidFill>
+                  <a:schemeClr val="accent5">
+                    <a:lumMod val="50000"/>
+                  </a:schemeClr>
+                </a:solidFill>
+              </a:rPr>
+              <a:t>preenchimento.</a:t>
+            </a:r>
+            <a:endParaRPr lang="pt-BR" sz="1200" dirty="0" smtClean="0">
+              <a:solidFill>
+                <a:schemeClr val="accent5">
+                  <a:lumMod val="50000"/>
+                </a:schemeClr>
+              </a:solidFill>
+            </a:endParaRPr>
           </a:p>
           <a:p>
             <a:pPr marL="285750" indent="-285750">
@@ -7121,8 +7304,45 @@
                   </a:schemeClr>
                 </a:solidFill>
               </a:rPr>
-              <a:t>: Não identificou-se nenhum par de variáveis com correlação forte</a:t>
-            </a:r>
+              <a:t>: Não </a:t>
+            </a:r>
+            <a:r>
+              <a:rPr lang="pt-BR" sz="1200" dirty="0" smtClean="0">
+                <a:solidFill>
+                  <a:schemeClr val="accent5">
+                    <a:lumMod val="50000"/>
+                  </a:schemeClr>
+                </a:solidFill>
+              </a:rPr>
+              <a:t>se identificou </a:t>
+            </a:r>
+            <a:r>
+              <a:rPr lang="pt-BR" sz="1200" dirty="0" smtClean="0">
+                <a:solidFill>
+                  <a:schemeClr val="accent5">
+                    <a:lumMod val="50000"/>
+                  </a:schemeClr>
+                </a:solidFill>
+              </a:rPr>
+              <a:t>nenhum par de variáveis com correlação </a:t>
+            </a:r>
+            <a:r>
+              <a:rPr lang="pt-BR" sz="1200" dirty="0" smtClean="0">
+                <a:solidFill>
+                  <a:schemeClr val="accent5">
+                    <a:lumMod val="50000"/>
+                  </a:schemeClr>
+                </a:solidFill>
+              </a:rPr>
+              <a:t>forte.</a:t>
+            </a:r>
+            <a:endParaRPr lang="pt-BR" sz="1200" dirty="0" smtClean="0">
+              <a:solidFill>
+                <a:schemeClr val="accent5">
+                  <a:lumMod val="50000"/>
+                </a:schemeClr>
+              </a:solidFill>
+            </a:endParaRPr>
           </a:p>
           <a:p>
             <a:pPr marL="285750" indent="-285750">
@@ -7177,8 +7397,25 @@
                   </a:schemeClr>
                 </a:solidFill>
               </a:rPr>
-              <a:t> identificados se tratavam de valores corretos, como por exemplo os atributos de gols, que foram altos em grandes goleadas</a:t>
-            </a:r>
+              <a:t> identificados se tratavam de valores corretos, como por exemplo os atributos de gols, que foram altos em grandes </a:t>
+            </a:r>
+            <a:r>
+              <a:rPr lang="pt-BR" sz="1200" dirty="0" smtClean="0">
+                <a:solidFill>
+                  <a:schemeClr val="accent5">
+                    <a:lumMod val="50000"/>
+                  </a:schemeClr>
+                </a:solidFill>
+              </a:rPr>
+              <a:t>goleadas.</a:t>
+            </a:r>
+            <a:endParaRPr lang="pt-BR" sz="1200" dirty="0" smtClean="0">
+              <a:solidFill>
+                <a:schemeClr val="accent5">
+                  <a:lumMod val="50000"/>
+                </a:schemeClr>
+              </a:solidFill>
+            </a:endParaRPr>
           </a:p>
         </p:txBody>
       </p:sp>
@@ -7445,6 +7682,16 @@
               </a:rPr>
               <a:t>muito_alto</a:t>
             </a:r>
+            <a:r>
+              <a:rPr lang="pt-BR" sz="1200" dirty="0" smtClean="0">
+                <a:solidFill>
+                  <a:schemeClr val="accent5">
+                    <a:lumMod val="50000"/>
+                  </a:schemeClr>
+                </a:solidFill>
+              </a:rPr>
+              <a:t>.</a:t>
+            </a:r>
             <a:endParaRPr lang="pt-BR" sz="1200" dirty="0">
               <a:solidFill>
                 <a:schemeClr val="accent5">
@@ -7476,7 +7723,23 @@
                   </a:schemeClr>
                 </a:solidFill>
               </a:rPr>
-              <a:t>: a normalização por escala </a:t>
+              <a:t>: a normalização por escala foi aplicada nos atributos numéricos.</a:t>
+            </a:r>
+          </a:p>
+          <a:p>
+            <a:pPr marL="285750" indent="-285750">
+              <a:buFontTx/>
+              <a:buChar char="-"/>
+            </a:pPr>
+            <a:r>
+              <a:rPr lang="pt-BR" sz="1200" b="1" dirty="0" smtClean="0">
+                <a:solidFill>
+                  <a:schemeClr val="accent5">
+                    <a:lumMod val="50000"/>
+                  </a:schemeClr>
+                </a:solidFill>
+              </a:rPr>
+              <a:t>Codificação de Variáveis Categóricas</a:t>
             </a:r>
             <a:r>
               <a:rPr lang="pt-BR" sz="1200" dirty="0" smtClean="0">
@@ -7486,7 +7749,37 @@
                   </a:schemeClr>
                 </a:solidFill>
               </a:rPr>
-              <a:t>foi aplicada </a:t>
+              <a:t>: foi procedido o </a:t>
+            </a:r>
+            <a:r>
+              <a:rPr lang="pt-BR" sz="1200" i="1" dirty="0" err="1" smtClean="0">
+                <a:solidFill>
+                  <a:schemeClr val="accent5">
+                    <a:lumMod val="50000"/>
+                  </a:schemeClr>
+                </a:solidFill>
+              </a:rPr>
+              <a:t>Label</a:t>
+            </a:r>
+            <a:r>
+              <a:rPr lang="pt-BR" sz="1200" i="1" dirty="0" smtClean="0">
+                <a:solidFill>
+                  <a:schemeClr val="accent5">
+                    <a:lumMod val="50000"/>
+                  </a:schemeClr>
+                </a:solidFill>
+              </a:rPr>
+              <a:t> </a:t>
+            </a:r>
+            <a:r>
+              <a:rPr lang="pt-BR" sz="1200" i="1" dirty="0" err="1" smtClean="0">
+                <a:solidFill>
+                  <a:schemeClr val="accent5">
+                    <a:lumMod val="50000"/>
+                  </a:schemeClr>
+                </a:solidFill>
+              </a:rPr>
+              <a:t>Encoding</a:t>
             </a:r>
             <a:r>
               <a:rPr lang="pt-BR" sz="1200" dirty="0" smtClean="0">
@@ -7496,7 +7789,37 @@
                   </a:schemeClr>
                 </a:solidFill>
               </a:rPr>
-              <a:t>n</a:t>
+              <a:t> para as variáveis e grau de investimento, e o </a:t>
+            </a:r>
+            <a:r>
+              <a:rPr lang="pt-BR" sz="1200" i="1" dirty="0" err="1" smtClean="0">
+                <a:solidFill>
+                  <a:schemeClr val="accent5">
+                    <a:lumMod val="50000"/>
+                  </a:schemeClr>
+                </a:solidFill>
+              </a:rPr>
+              <a:t>Dummy</a:t>
+            </a:r>
+            <a:r>
+              <a:rPr lang="pt-BR" sz="1200" i="1" dirty="0" smtClean="0">
+                <a:solidFill>
+                  <a:schemeClr val="accent5">
+                    <a:lumMod val="50000"/>
+                  </a:schemeClr>
+                </a:solidFill>
+              </a:rPr>
+              <a:t> </a:t>
+            </a:r>
+            <a:r>
+              <a:rPr lang="pt-BR" sz="1200" i="1" dirty="0" err="1" smtClean="0">
+                <a:solidFill>
+                  <a:schemeClr val="accent5">
+                    <a:lumMod val="50000"/>
+                  </a:schemeClr>
+                </a:solidFill>
+              </a:rPr>
+              <a:t>Encoding</a:t>
             </a:r>
             <a:r>
               <a:rPr lang="pt-BR" sz="1200" dirty="0" smtClean="0">
@@ -7506,7 +7829,17 @@
                   </a:schemeClr>
                 </a:solidFill>
               </a:rPr>
-              <a:t>os atributos numéricos.</a:t>
+              <a:t> para as demais variáveis </a:t>
+            </a:r>
+            <a:r>
+              <a:rPr lang="pt-BR" sz="1200" dirty="0" smtClean="0">
+                <a:solidFill>
+                  <a:schemeClr val="accent5">
+                    <a:lumMod val="50000"/>
+                  </a:schemeClr>
+                </a:solidFill>
+              </a:rPr>
+              <a:t>categóricas.</a:t>
             </a:r>
             <a:endParaRPr lang="pt-BR" sz="1200" dirty="0" smtClean="0">
               <a:solidFill>
@@ -7515,112 +7848,6 @@
                 </a:schemeClr>
               </a:solidFill>
             </a:endParaRPr>
-          </a:p>
-          <a:p>
-            <a:pPr marL="285750" indent="-285750">
-              <a:buFontTx/>
-              <a:buChar char="-"/>
-            </a:pPr>
-            <a:r>
-              <a:rPr lang="pt-BR" sz="1200" b="1" dirty="0" smtClean="0">
-                <a:solidFill>
-                  <a:schemeClr val="accent5">
-                    <a:lumMod val="50000"/>
-                  </a:schemeClr>
-                </a:solidFill>
-              </a:rPr>
-              <a:t>Codificação de Variáveis Categóricas</a:t>
-            </a:r>
-            <a:r>
-              <a:rPr lang="pt-BR" sz="1200" dirty="0" smtClean="0">
-                <a:solidFill>
-                  <a:schemeClr val="accent5">
-                    <a:lumMod val="50000"/>
-                  </a:schemeClr>
-                </a:solidFill>
-              </a:rPr>
-              <a:t>: foi procedido o </a:t>
-            </a:r>
-            <a:r>
-              <a:rPr lang="pt-BR" sz="1200" i="1" dirty="0" err="1" smtClean="0">
-                <a:solidFill>
-                  <a:schemeClr val="accent5">
-                    <a:lumMod val="50000"/>
-                  </a:schemeClr>
-                </a:solidFill>
-              </a:rPr>
-              <a:t>Label</a:t>
-            </a:r>
-            <a:r>
-              <a:rPr lang="pt-BR" sz="1200" i="1" dirty="0" smtClean="0">
-                <a:solidFill>
-                  <a:schemeClr val="accent5">
-                    <a:lumMod val="50000"/>
-                  </a:schemeClr>
-                </a:solidFill>
-              </a:rPr>
-              <a:t> </a:t>
-            </a:r>
-            <a:r>
-              <a:rPr lang="pt-BR" sz="1200" i="1" dirty="0" err="1" smtClean="0">
-                <a:solidFill>
-                  <a:schemeClr val="accent5">
-                    <a:lumMod val="50000"/>
-                  </a:schemeClr>
-                </a:solidFill>
-              </a:rPr>
-              <a:t>Encoding</a:t>
-            </a:r>
-            <a:r>
-              <a:rPr lang="pt-BR" sz="1200" dirty="0" smtClean="0">
-                <a:solidFill>
-                  <a:schemeClr val="accent5">
-                    <a:lumMod val="50000"/>
-                  </a:schemeClr>
-                </a:solidFill>
-              </a:rPr>
-              <a:t> para as variáveis e grau de investimento, e o </a:t>
-            </a:r>
-            <a:r>
-              <a:rPr lang="pt-BR" sz="1200" i="1" dirty="0" err="1" smtClean="0">
-                <a:solidFill>
-                  <a:schemeClr val="accent5">
-                    <a:lumMod val="50000"/>
-                  </a:schemeClr>
-                </a:solidFill>
-              </a:rPr>
-              <a:t>Dummy</a:t>
-            </a:r>
-            <a:r>
-              <a:rPr lang="pt-BR" sz="1200" i="1" dirty="0" smtClean="0">
-                <a:solidFill>
-                  <a:schemeClr val="accent5">
-                    <a:lumMod val="50000"/>
-                  </a:schemeClr>
-                </a:solidFill>
-              </a:rPr>
-              <a:t> </a:t>
-            </a:r>
-            <a:r>
-              <a:rPr lang="pt-BR" sz="1200" i="1" dirty="0" err="1" smtClean="0">
-                <a:solidFill>
-                  <a:schemeClr val="accent5">
-                    <a:lumMod val="50000"/>
-                  </a:schemeClr>
-                </a:solidFill>
-              </a:rPr>
-              <a:t>Encoding</a:t>
-            </a:r>
-            <a:r>
-              <a:rPr lang="pt-BR" sz="1200" dirty="0" smtClean="0">
-                <a:solidFill>
-                  <a:schemeClr val="accent5">
-                    <a:lumMod val="50000"/>
-                  </a:schemeClr>
-                </a:solidFill>
-              </a:rPr>
-              <a:t> para as demais variáveis categóricas</a:t>
-            </a:r>
           </a:p>
           <a:p>
             <a:pPr marL="285750" indent="-285750">
@@ -7719,8 +7946,8 @@
         </p:blipFill>
         <p:spPr>
           <a:xfrm>
-            <a:off x="2738611" y="9085263"/>
-            <a:ext cx="1379986" cy="1079861"/>
+            <a:off x="3515733" y="8648405"/>
+            <a:ext cx="1897690" cy="1484972"/>
           </a:xfrm>
           <a:prstGeom prst="rect">
             <a:avLst/>
@@ -7749,8 +7976,8 @@
         </p:blipFill>
         <p:spPr>
           <a:xfrm>
-            <a:off x="477369" y="9085262"/>
-            <a:ext cx="2073898" cy="1079861"/>
+            <a:off x="576037" y="8648404"/>
+            <a:ext cx="2851923" cy="1484972"/>
           </a:xfrm>
           <a:prstGeom prst="rect">
             <a:avLst/>
@@ -8364,8 +8591,8 @@
         </p:blipFill>
         <p:spPr>
           <a:xfrm>
-            <a:off x="7024257" y="8463542"/>
-            <a:ext cx="1620983" cy="612160"/>
+            <a:off x="5986560" y="8581810"/>
+            <a:ext cx="2229747" cy="842058"/>
           </a:xfrm>
           <a:prstGeom prst="rect">
             <a:avLst/>
@@ -8394,8 +8621,8 @@
         </p:blipFill>
         <p:spPr>
           <a:xfrm>
-            <a:off x="12145817" y="7427783"/>
-            <a:ext cx="1888482" cy="797029"/>
+            <a:off x="11575997" y="7151526"/>
+            <a:ext cx="2656625" cy="1121222"/>
           </a:xfrm>
           <a:prstGeom prst="rect">
             <a:avLst/>
@@ -8404,7 +8631,7 @@
       </p:pic>
       <p:pic>
         <p:nvPicPr>
-          <p:cNvPr id="59" name="Imagem 58"/>
+          <p:cNvPr id="60" name="Imagem 59"/>
           <p:cNvPicPr>
             <a:picLocks noChangeAspect="1"/>
           </p:cNvPicPr>
@@ -8424,8 +8651,8 @@
         </p:blipFill>
         <p:spPr>
           <a:xfrm>
-            <a:off x="6230221" y="9121428"/>
-            <a:ext cx="3358063" cy="1079861"/>
+            <a:off x="14324934" y="7191826"/>
+            <a:ext cx="2621029" cy="1033860"/>
           </a:xfrm>
           <a:prstGeom prst="rect">
             <a:avLst/>
@@ -8434,7 +8661,7 @@
       </p:pic>
       <p:pic>
         <p:nvPicPr>
-          <p:cNvPr id="60" name="Imagem 59"/>
+          <p:cNvPr id="61" name="Imagem 60"/>
           <p:cNvPicPr>
             <a:picLocks noChangeAspect="1"/>
           </p:cNvPicPr>
@@ -8454,38 +8681,8 @@
         </p:blipFill>
         <p:spPr>
           <a:xfrm>
-            <a:off x="14063276" y="7427783"/>
-            <a:ext cx="2020618" cy="797029"/>
-          </a:xfrm>
-          <a:prstGeom prst="rect">
-            <a:avLst/>
-          </a:prstGeom>
-        </p:spPr>
-      </p:pic>
-      <p:pic>
-        <p:nvPicPr>
-          <p:cNvPr id="61" name="Imagem 60"/>
-          <p:cNvPicPr>
-            <a:picLocks noChangeAspect="1"/>
-          </p:cNvPicPr>
-          <p:nvPr/>
-        </p:nvPicPr>
-        <p:blipFill>
-          <a:blip r:embed="rId17" cstate="print">
-            <a:extLst>
-              <a:ext uri="{28A0092B-C50C-407E-A947-70E740481C1C}">
-                <a14:useLocalDpi xmlns:a14="http://schemas.microsoft.com/office/drawing/2010/main" val="0"/>
-              </a:ext>
-            </a:extLst>
-          </a:blip>
-          <a:stretch>
-            <a:fillRect/>
-          </a:stretch>
-        </p:blipFill>
-        <p:spPr>
-          <a:xfrm>
-            <a:off x="13214782" y="9187680"/>
-            <a:ext cx="1901538" cy="1034707"/>
+            <a:off x="14365011" y="9092726"/>
+            <a:ext cx="2054383" cy="1117876"/>
           </a:xfrm>
           <a:prstGeom prst="rect">
             <a:avLst/>
@@ -8501,7 +8698,7 @@
           <p:nvPr/>
         </p:nvPicPr>
         <p:blipFill>
-          <a:blip r:embed="rId18" cstate="print">
+          <a:blip r:embed="rId17" cstate="print">
             <a:extLst>
               <a:ext uri="{28A0092B-C50C-407E-A947-70E740481C1C}">
                 <a14:useLocalDpi xmlns:a14="http://schemas.microsoft.com/office/drawing/2010/main" val="0"/>
@@ -8531,7 +8728,7 @@
           <p:nvPr/>
         </p:nvPicPr>
         <p:blipFill>
-          <a:blip r:embed="rId19" cstate="print">
+          <a:blip r:embed="rId18" cstate="print">
             <a:extLst>
               <a:ext uri="{28A0092B-C50C-407E-A947-70E740481C1C}">
                 <a14:useLocalDpi xmlns:a14="http://schemas.microsoft.com/office/drawing/2010/main" val="0"/>
@@ -8636,6 +8833,126 @@
           </a:p>
         </p:txBody>
       </p:sp>
+      <p:pic>
+        <p:nvPicPr>
+          <p:cNvPr id="2" name="Imagem 1"/>
+          <p:cNvPicPr>
+            <a:picLocks noChangeAspect="1"/>
+          </p:cNvPicPr>
+          <p:nvPr/>
+        </p:nvPicPr>
+        <p:blipFill>
+          <a:blip r:embed="rId19" cstate="print">
+            <a:extLst>
+              <a:ext uri="{28A0092B-C50C-407E-A947-70E740481C1C}">
+                <a14:useLocalDpi xmlns:a14="http://schemas.microsoft.com/office/drawing/2010/main" val="0"/>
+              </a:ext>
+            </a:extLst>
+          </a:blip>
+          <a:stretch>
+            <a:fillRect/>
+          </a:stretch>
+        </p:blipFill>
+        <p:spPr>
+          <a:xfrm>
+            <a:off x="8270981" y="8348255"/>
+            <a:ext cx="2987048" cy="1323284"/>
+          </a:xfrm>
+          <a:prstGeom prst="rect">
+            <a:avLst/>
+          </a:prstGeom>
+        </p:spPr>
+      </p:pic>
+      <p:pic>
+        <p:nvPicPr>
+          <p:cNvPr id="3" name="Imagem 2"/>
+          <p:cNvPicPr>
+            <a:picLocks noChangeAspect="1"/>
+          </p:cNvPicPr>
+          <p:nvPr/>
+        </p:nvPicPr>
+        <p:blipFill>
+          <a:blip r:embed="rId20" cstate="print">
+            <a:extLst>
+              <a:ext uri="{28A0092B-C50C-407E-A947-70E740481C1C}">
+                <a14:useLocalDpi xmlns:a14="http://schemas.microsoft.com/office/drawing/2010/main" val="0"/>
+              </a:ext>
+            </a:extLst>
+          </a:blip>
+          <a:stretch>
+            <a:fillRect/>
+          </a:stretch>
+        </p:blipFill>
+        <p:spPr>
+          <a:xfrm>
+            <a:off x="12213841" y="9232781"/>
+            <a:ext cx="2079482" cy="877516"/>
+          </a:xfrm>
+          <a:prstGeom prst="rect">
+            <a:avLst/>
+          </a:prstGeom>
+        </p:spPr>
+      </p:pic>
+      <p:pic>
+        <p:nvPicPr>
+          <p:cNvPr id="5" name="Imagem 4"/>
+          <p:cNvPicPr>
+            <a:picLocks noChangeAspect="1"/>
+          </p:cNvPicPr>
+          <p:nvPr/>
+        </p:nvPicPr>
+        <p:blipFill>
+          <a:blip r:embed="rId21" cstate="print">
+            <a:extLst>
+              <a:ext uri="{28A0092B-C50C-407E-A947-70E740481C1C}">
+                <a14:useLocalDpi xmlns:a14="http://schemas.microsoft.com/office/drawing/2010/main" val="0"/>
+              </a:ext>
+            </a:extLst>
+          </a:blip>
+          <a:stretch>
+            <a:fillRect/>
+          </a:stretch>
+        </p:blipFill>
+        <p:spPr>
+          <a:xfrm>
+            <a:off x="1024697" y="4582879"/>
+            <a:ext cx="1686167" cy="1348393"/>
+          </a:xfrm>
+          <a:prstGeom prst="rect">
+            <a:avLst/>
+          </a:prstGeom>
+        </p:spPr>
+      </p:pic>
+      <p:pic>
+        <p:nvPicPr>
+          <p:cNvPr id="6" name="Imagem 5"/>
+          <p:cNvPicPr>
+            <a:picLocks noChangeAspect="1"/>
+          </p:cNvPicPr>
+          <p:nvPr/>
+        </p:nvPicPr>
+        <p:blipFill>
+          <a:blip r:embed="rId22" cstate="print">
+            <a:extLst>
+              <a:ext uri="{28A0092B-C50C-407E-A947-70E740481C1C}">
+                <a14:useLocalDpi xmlns:a14="http://schemas.microsoft.com/office/drawing/2010/main" val="0"/>
+              </a:ext>
+            </a:extLst>
+          </a:blip>
+          <a:stretch>
+            <a:fillRect/>
+          </a:stretch>
+        </p:blipFill>
+        <p:spPr>
+          <a:xfrm>
+            <a:off x="3003131" y="4567784"/>
+            <a:ext cx="1665584" cy="1373153"/>
+          </a:xfrm>
+          <a:prstGeom prst="rect">
+            <a:avLst/>
+          </a:prstGeom>
+        </p:spPr>
+      </p:pic>
     </p:spTree>
     <p:extLst>
       <p:ext uri="{BB962C8B-B14F-4D97-AF65-F5344CB8AC3E}">

</xml_diff>

<commit_message>
Elaboração Apresentação do TCC
</commit_message>
<xml_diff>
--- a/Figuras/Quadro Resumo do Projetos.pptx
+++ b/Figuras/Quadro Resumo do Projetos.pptx
@@ -197,7 +197,7 @@
           <a:p>
             <a:fld id="{17E9DA2D-A4A7-49DF-9DB9-F9B5E6338C63}" type="datetimeFigureOut">
               <a:rPr lang="pt-BR" smtClean="0"/>
-              <a:t>24/05/2024</a:t>
+              <a:t>25/05/2024</a:t>
             </a:fld>
             <a:endParaRPr lang="pt-BR"/>
           </a:p>
@@ -680,7 +680,7 @@
           <a:p>
             <a:fld id="{C9864974-4C61-46D2-AAC9-95B55E379313}" type="datetimeFigureOut">
               <a:rPr lang="pt-BR" smtClean="0"/>
-              <a:t>24/05/2024</a:t>
+              <a:t>25/05/2024</a:t>
             </a:fld>
             <a:endParaRPr lang="pt-BR"/>
           </a:p>
@@ -850,7 +850,7 @@
           <a:p>
             <a:fld id="{C9864974-4C61-46D2-AAC9-95B55E379313}" type="datetimeFigureOut">
               <a:rPr lang="pt-BR" smtClean="0"/>
-              <a:t>24/05/2024</a:t>
+              <a:t>25/05/2024</a:t>
             </a:fld>
             <a:endParaRPr lang="pt-BR"/>
           </a:p>
@@ -1030,7 +1030,7 @@
           <a:p>
             <a:fld id="{C9864974-4C61-46D2-AAC9-95B55E379313}" type="datetimeFigureOut">
               <a:rPr lang="pt-BR" smtClean="0"/>
-              <a:t>24/05/2024</a:t>
+              <a:t>25/05/2024</a:t>
             </a:fld>
             <a:endParaRPr lang="pt-BR"/>
           </a:p>
@@ -1200,7 +1200,7 @@
           <a:p>
             <a:fld id="{C9864974-4C61-46D2-AAC9-95B55E379313}" type="datetimeFigureOut">
               <a:rPr lang="pt-BR" smtClean="0"/>
-              <a:t>24/05/2024</a:t>
+              <a:t>25/05/2024</a:t>
             </a:fld>
             <a:endParaRPr lang="pt-BR"/>
           </a:p>
@@ -1446,7 +1446,7 @@
           <a:p>
             <a:fld id="{C9864974-4C61-46D2-AAC9-95B55E379313}" type="datetimeFigureOut">
               <a:rPr lang="pt-BR" smtClean="0"/>
-              <a:t>24/05/2024</a:t>
+              <a:t>25/05/2024</a:t>
             </a:fld>
             <a:endParaRPr lang="pt-BR"/>
           </a:p>
@@ -1678,7 +1678,7 @@
           <a:p>
             <a:fld id="{C9864974-4C61-46D2-AAC9-95B55E379313}" type="datetimeFigureOut">
               <a:rPr lang="pt-BR" smtClean="0"/>
-              <a:t>24/05/2024</a:t>
+              <a:t>25/05/2024</a:t>
             </a:fld>
             <a:endParaRPr lang="pt-BR"/>
           </a:p>
@@ -2045,7 +2045,7 @@
           <a:p>
             <a:fld id="{C9864974-4C61-46D2-AAC9-95B55E379313}" type="datetimeFigureOut">
               <a:rPr lang="pt-BR" smtClean="0"/>
-              <a:t>24/05/2024</a:t>
+              <a:t>25/05/2024</a:t>
             </a:fld>
             <a:endParaRPr lang="pt-BR"/>
           </a:p>
@@ -2163,7 +2163,7 @@
           <a:p>
             <a:fld id="{C9864974-4C61-46D2-AAC9-95B55E379313}" type="datetimeFigureOut">
               <a:rPr lang="pt-BR" smtClean="0"/>
-              <a:t>24/05/2024</a:t>
+              <a:t>25/05/2024</a:t>
             </a:fld>
             <a:endParaRPr lang="pt-BR"/>
           </a:p>
@@ -2258,7 +2258,7 @@
           <a:p>
             <a:fld id="{C9864974-4C61-46D2-AAC9-95B55E379313}" type="datetimeFigureOut">
               <a:rPr lang="pt-BR" smtClean="0"/>
-              <a:t>24/05/2024</a:t>
+              <a:t>25/05/2024</a:t>
             </a:fld>
             <a:endParaRPr lang="pt-BR"/>
           </a:p>
@@ -2535,7 +2535,7 @@
           <a:p>
             <a:fld id="{C9864974-4C61-46D2-AAC9-95B55E379313}" type="datetimeFigureOut">
               <a:rPr lang="pt-BR" smtClean="0"/>
-              <a:t>24/05/2024</a:t>
+              <a:t>25/05/2024</a:t>
             </a:fld>
             <a:endParaRPr lang="pt-BR"/>
           </a:p>
@@ -2788,7 +2788,7 @@
           <a:p>
             <a:fld id="{C9864974-4C61-46D2-AAC9-95B55E379313}" type="datetimeFigureOut">
               <a:rPr lang="pt-BR" smtClean="0"/>
-              <a:t>24/05/2024</a:t>
+              <a:t>25/05/2024</a:t>
             </a:fld>
             <a:endParaRPr lang="pt-BR"/>
           </a:p>
@@ -3001,7 +3001,7 @@
           <a:p>
             <a:fld id="{C9864974-4C61-46D2-AAC9-95B55E379313}" type="datetimeFigureOut">
               <a:rPr lang="pt-BR" smtClean="0"/>
-              <a:t>24/05/2024</a:t>
+              <a:t>25/05/2024</a:t>
             </a:fld>
             <a:endParaRPr lang="pt-BR"/>
           </a:p>
@@ -6876,8 +6876,8 @@
         </p:nvSpPr>
         <p:spPr>
           <a:xfrm>
-            <a:off x="1182245" y="759753"/>
-            <a:ext cx="3057238" cy="523220"/>
+            <a:off x="786595" y="759753"/>
+            <a:ext cx="3057238" cy="553998"/>
           </a:xfrm>
           <a:prstGeom prst="rect">
             <a:avLst/>
@@ -6916,7 +6916,15 @@
             </a:r>
             <a:r>
               <a:rPr lang="pt-BR" dirty="0"/>
-              <a:t>no Modelo CRISP-DM </a:t>
+              <a:t>no Modelo </a:t>
+            </a:r>
+            <a:r>
+              <a:rPr lang="pt-BR" sz="1600" dirty="0"/>
+              <a:t>CRISP-DM</a:t>
+            </a:r>
+            <a:r>
+              <a:rPr lang="pt-BR" dirty="0"/>
+              <a:t> </a:t>
             </a:r>
           </a:p>
         </p:txBody>
@@ -6943,7 +6951,7 @@
         </p:blipFill>
         <p:spPr>
           <a:xfrm>
-            <a:off x="4378866" y="470304"/>
+            <a:off x="3983216" y="470304"/>
             <a:ext cx="1209130" cy="1212151"/>
           </a:xfrm>
           <a:prstGeom prst="rect">
@@ -7202,8 +7210,8 @@
         </p:nvSpPr>
         <p:spPr>
           <a:xfrm>
-            <a:off x="7474184" y="759753"/>
-            <a:ext cx="2507675" cy="523220"/>
+            <a:off x="6611815" y="583913"/>
+            <a:ext cx="4590919" cy="338554"/>
           </a:xfrm>
           <a:prstGeom prst="rect">
             <a:avLst/>
@@ -7229,29 +7237,16 @@
             </a:lvl1pPr>
           </a:lstStyle>
           <a:p>
-            <a:r>
-              <a:rPr lang="pt-BR" dirty="0" smtClean="0"/>
-              <a:t>Ambiente de Desenvolvimento:</a:t>
-            </a:r>
-          </a:p>
-          <a:p>
-            <a:r>
-              <a:rPr lang="pt-BR" dirty="0" smtClean="0"/>
-              <a:t>Python, Google </a:t>
-            </a:r>
-            <a:r>
-              <a:rPr lang="pt-BR" dirty="0" err="1" smtClean="0"/>
-              <a:t>Colab</a:t>
-            </a:r>
-            <a:r>
-              <a:rPr lang="pt-BR" dirty="0" smtClean="0"/>
-              <a:t>, </a:t>
-            </a:r>
-            <a:r>
-              <a:rPr lang="pt-BR" dirty="0" err="1" smtClean="0"/>
-              <a:t>VSCode</a:t>
-            </a:r>
-            <a:endParaRPr lang="pt-BR" dirty="0"/>
+            <a:pPr algn="ctr"/>
+            <a:r>
+              <a:rPr lang="pt-BR" sz="1600" dirty="0" smtClean="0"/>
+              <a:t>Ambiente de </a:t>
+            </a:r>
+            <a:r>
+              <a:rPr lang="pt-BR" sz="1600" dirty="0" smtClean="0"/>
+              <a:t>Desenvolvimento:</a:t>
+            </a:r>
+            <a:endParaRPr lang="pt-BR" sz="1600" dirty="0"/>
           </a:p>
         </p:txBody>
       </p:sp>
@@ -8754,47 +8749,7 @@
                   </a:schemeClr>
                 </a:solidFill>
               </a:rPr>
-              <a:t>:  </a:t>
-            </a:r>
-            <a:r>
-              <a:rPr lang="pt-BR" sz="1200" dirty="0" smtClean="0">
-                <a:solidFill>
-                  <a:schemeClr val="accent5">
-                    <a:lumMod val="50000"/>
-                  </a:schemeClr>
-                </a:solidFill>
-              </a:rPr>
-              <a:t>recebe </a:t>
-            </a:r>
-            <a:r>
-              <a:rPr lang="pt-BR" sz="1200" dirty="0" smtClean="0">
-                <a:solidFill>
-                  <a:schemeClr val="accent5">
-                    <a:lumMod val="50000"/>
-                  </a:schemeClr>
-                </a:solidFill>
-              </a:rPr>
-              <a:t>entrada de dados de jogos por um usuário, e </a:t>
-            </a:r>
-            <a:r>
-              <a:rPr lang="pt-BR" sz="1200" dirty="0" smtClean="0">
-                <a:solidFill>
-                  <a:schemeClr val="accent5">
-                    <a:lumMod val="50000"/>
-                  </a:schemeClr>
-                </a:solidFill>
-              </a:rPr>
-              <a:t>fornece </a:t>
-            </a:r>
-            <a:r>
-              <a:rPr lang="pt-BR" sz="1200" dirty="0" smtClean="0">
-                <a:solidFill>
-                  <a:schemeClr val="accent5">
-                    <a:lumMod val="50000"/>
-                  </a:schemeClr>
-                </a:solidFill>
-              </a:rPr>
-              <a:t>a estimativa de público</a:t>
+              <a:t>:  recebe entrada de dados de jogos por um usuário, e fornece a estimativa de público</a:t>
             </a:r>
             <a:endParaRPr lang="pt-BR" sz="1200" dirty="0">
               <a:solidFill>
@@ -8828,7 +8783,7 @@
         </p:blipFill>
         <p:spPr>
           <a:xfrm>
-            <a:off x="5986560" y="8581810"/>
+            <a:off x="6000300" y="8363385"/>
             <a:ext cx="2229747" cy="842058"/>
           </a:xfrm>
           <a:prstGeom prst="rect">
@@ -8948,38 +8903,8 @@
         </p:blipFill>
         <p:spPr>
           <a:xfrm>
-            <a:off x="10232697" y="491071"/>
+            <a:off x="11226229" y="491071"/>
             <a:ext cx="2158963" cy="1175811"/>
-          </a:xfrm>
-          <a:prstGeom prst="rect">
-            <a:avLst/>
-          </a:prstGeom>
-        </p:spPr>
-      </p:pic>
-      <p:pic>
-        <p:nvPicPr>
-          <p:cNvPr id="64" name="Imagem 63"/>
-          <p:cNvPicPr>
-            <a:picLocks noChangeAspect="1"/>
-          </p:cNvPicPr>
-          <p:nvPr/>
-        </p:nvPicPr>
-        <p:blipFill>
-          <a:blip r:embed="rId18" cstate="print">
-            <a:extLst>
-              <a:ext uri="{28A0092B-C50C-407E-A947-70E740481C1C}">
-                <a14:useLocalDpi xmlns:a14="http://schemas.microsoft.com/office/drawing/2010/main" val="0"/>
-              </a:ext>
-            </a:extLst>
-          </a:blip>
-          <a:stretch>
-            <a:fillRect/>
-          </a:stretch>
-        </p:blipFill>
-        <p:spPr>
-          <a:xfrm>
-            <a:off x="13149969" y="483243"/>
-            <a:ext cx="2170702" cy="1175797"/>
           </a:xfrm>
           <a:prstGeom prst="rect">
             <a:avLst/>
@@ -9079,7 +9004,7 @@
           <p:nvPr/>
         </p:nvPicPr>
         <p:blipFill>
-          <a:blip r:embed="rId19" cstate="print">
+          <a:blip r:embed="rId18" cstate="print">
             <a:extLst>
               <a:ext uri="{28A0092B-C50C-407E-A947-70E740481C1C}">
                 <a14:useLocalDpi xmlns:a14="http://schemas.microsoft.com/office/drawing/2010/main" val="0"/>
@@ -9092,7 +9017,7 @@
         </p:blipFill>
         <p:spPr>
           <a:xfrm>
-            <a:off x="8274984" y="8363385"/>
+            <a:off x="8272473" y="8571139"/>
             <a:ext cx="2987048" cy="1323284"/>
           </a:xfrm>
           <a:prstGeom prst="rect">
@@ -9109,7 +9034,7 @@
           <p:nvPr/>
         </p:nvPicPr>
         <p:blipFill>
-          <a:blip r:embed="rId20" cstate="print">
+          <a:blip r:embed="rId19" cstate="print">
             <a:extLst>
               <a:ext uri="{28A0092B-C50C-407E-A947-70E740481C1C}">
                 <a14:useLocalDpi xmlns:a14="http://schemas.microsoft.com/office/drawing/2010/main" val="0"/>
@@ -9139,7 +9064,7 @@
           <p:nvPr/>
         </p:nvPicPr>
         <p:blipFill>
-          <a:blip r:embed="rId21" cstate="print">
+          <a:blip r:embed="rId20" cstate="print">
             <a:extLst>
               <a:ext uri="{28A0092B-C50C-407E-A947-70E740481C1C}">
                 <a14:useLocalDpi xmlns:a14="http://schemas.microsoft.com/office/drawing/2010/main" val="0"/>
@@ -9169,7 +9094,7 @@
           <p:nvPr/>
         </p:nvPicPr>
         <p:blipFill>
-          <a:blip r:embed="rId22" cstate="print">
+          <a:blip r:embed="rId21" cstate="print">
             <a:extLst>
               <a:ext uri="{28A0092B-C50C-407E-A947-70E740481C1C}">
                 <a14:useLocalDpi xmlns:a14="http://schemas.microsoft.com/office/drawing/2010/main" val="0"/>
@@ -9190,6 +9115,408 @@
           </a:prstGeom>
         </p:spPr>
       </p:pic>
+      <p:pic>
+        <p:nvPicPr>
+          <p:cNvPr id="59" name="Imagem 58"/>
+          <p:cNvPicPr>
+            <a:picLocks noChangeAspect="1"/>
+          </p:cNvPicPr>
+          <p:nvPr/>
+        </p:nvPicPr>
+        <p:blipFill>
+          <a:blip r:embed="rId22">
+            <a:extLst>
+              <a:ext uri="{28A0092B-C50C-407E-A947-70E740481C1C}">
+                <a14:useLocalDpi xmlns:a14="http://schemas.microsoft.com/office/drawing/2010/main" val="0"/>
+              </a:ext>
+            </a:extLst>
+          </a:blip>
+          <a:stretch>
+            <a:fillRect/>
+          </a:stretch>
+        </p:blipFill>
+        <p:spPr>
+          <a:xfrm>
+            <a:off x="7403812" y="1009147"/>
+            <a:ext cx="457579" cy="457579"/>
+          </a:xfrm>
+          <a:prstGeom prst="rect">
+            <a:avLst/>
+          </a:prstGeom>
+        </p:spPr>
+      </p:pic>
+      <p:sp>
+        <p:nvSpPr>
+          <p:cNvPr id="62" name="CaixaDeTexto 61"/>
+          <p:cNvSpPr txBox="1"/>
+          <p:nvPr/>
+        </p:nvSpPr>
+        <p:spPr>
+          <a:xfrm>
+            <a:off x="7298331" y="1361980"/>
+            <a:ext cx="721672" cy="307777"/>
+          </a:xfrm>
+          <a:prstGeom prst="rect">
+            <a:avLst/>
+          </a:prstGeom>
+          <a:noFill/>
+        </p:spPr>
+        <p:txBody>
+          <a:bodyPr wrap="none" rtlCol="0">
+            <a:spAutoFit/>
+          </a:bodyPr>
+          <a:lstStyle/>
+          <a:p>
+            <a:r>
+              <a:rPr lang="pt-BR" sz="1400" b="1" dirty="0" smtClean="0">
+                <a:solidFill>
+                  <a:schemeClr val="accent5">
+                    <a:lumMod val="50000"/>
+                  </a:schemeClr>
+                </a:solidFill>
+              </a:rPr>
+              <a:t>pandas</a:t>
+            </a:r>
+            <a:endParaRPr lang="pt-BR" sz="2400" b="1" dirty="0">
+              <a:solidFill>
+                <a:schemeClr val="accent5">
+                  <a:lumMod val="50000"/>
+                </a:schemeClr>
+              </a:solidFill>
+            </a:endParaRPr>
+          </a:p>
+        </p:txBody>
+      </p:sp>
+      <p:pic>
+        <p:nvPicPr>
+          <p:cNvPr id="70" name="Imagem 69"/>
+          <p:cNvPicPr>
+            <a:picLocks noChangeAspect="1"/>
+          </p:cNvPicPr>
+          <p:nvPr/>
+        </p:nvPicPr>
+        <p:blipFill>
+          <a:blip r:embed="rId23" cstate="print">
+            <a:extLst>
+              <a:ext uri="{28A0092B-C50C-407E-A947-70E740481C1C}">
+                <a14:useLocalDpi xmlns:a14="http://schemas.microsoft.com/office/drawing/2010/main" val="0"/>
+              </a:ext>
+            </a:extLst>
+          </a:blip>
+          <a:stretch>
+            <a:fillRect/>
+          </a:stretch>
+        </p:blipFill>
+        <p:spPr>
+          <a:xfrm>
+            <a:off x="6404700" y="1082400"/>
+            <a:ext cx="1094259" cy="547130"/>
+          </a:xfrm>
+          <a:prstGeom prst="rect">
+            <a:avLst/>
+          </a:prstGeom>
+        </p:spPr>
+      </p:pic>
+      <p:pic>
+        <p:nvPicPr>
+          <p:cNvPr id="71" name="Imagem 70"/>
+          <p:cNvPicPr>
+            <a:picLocks noChangeAspect="1"/>
+          </p:cNvPicPr>
+          <p:nvPr/>
+        </p:nvPicPr>
+        <p:blipFill>
+          <a:blip r:embed="rId24" cstate="print">
+            <a:extLst>
+              <a:ext uri="{28A0092B-C50C-407E-A947-70E740481C1C}">
+                <a14:useLocalDpi xmlns:a14="http://schemas.microsoft.com/office/drawing/2010/main" val="0"/>
+              </a:ext>
+            </a:extLst>
+          </a:blip>
+          <a:stretch>
+            <a:fillRect/>
+          </a:stretch>
+        </p:blipFill>
+        <p:spPr>
+          <a:xfrm>
+            <a:off x="8099212" y="1007181"/>
+            <a:ext cx="627178" cy="577362"/>
+          </a:xfrm>
+          <a:prstGeom prst="rect">
+            <a:avLst/>
+          </a:prstGeom>
+        </p:spPr>
+      </p:pic>
+      <p:pic>
+        <p:nvPicPr>
+          <p:cNvPr id="72" name="Imagem 71"/>
+          <p:cNvPicPr>
+            <a:picLocks noChangeAspect="1"/>
+          </p:cNvPicPr>
+          <p:nvPr/>
+        </p:nvPicPr>
+        <p:blipFill>
+          <a:blip r:embed="rId25" cstate="print">
+            <a:extLst>
+              <a:ext uri="{28A0092B-C50C-407E-A947-70E740481C1C}">
+                <a14:useLocalDpi xmlns:a14="http://schemas.microsoft.com/office/drawing/2010/main" val="0"/>
+              </a:ext>
+            </a:extLst>
+          </a:blip>
+          <a:stretch>
+            <a:fillRect/>
+          </a:stretch>
+        </p:blipFill>
+        <p:spPr>
+          <a:xfrm>
+            <a:off x="8852349" y="1073607"/>
+            <a:ext cx="866435" cy="467875"/>
+          </a:xfrm>
+          <a:prstGeom prst="rect">
+            <a:avLst/>
+          </a:prstGeom>
+        </p:spPr>
+      </p:pic>
+      <p:pic>
+        <p:nvPicPr>
+          <p:cNvPr id="73" name="Imagem 72"/>
+          <p:cNvPicPr>
+            <a:picLocks noChangeAspect="1"/>
+          </p:cNvPicPr>
+          <p:nvPr/>
+        </p:nvPicPr>
+        <p:blipFill>
+          <a:blip r:embed="rId26" cstate="print">
+            <a:extLst>
+              <a:ext uri="{28A0092B-C50C-407E-A947-70E740481C1C}">
+                <a14:useLocalDpi xmlns:a14="http://schemas.microsoft.com/office/drawing/2010/main" val="0"/>
+              </a:ext>
+            </a:extLst>
+          </a:blip>
+          <a:stretch>
+            <a:fillRect/>
+          </a:stretch>
+        </p:blipFill>
+        <p:spPr>
+          <a:xfrm>
+            <a:off x="9853535" y="967026"/>
+            <a:ext cx="547354" cy="657932"/>
+          </a:xfrm>
+          <a:prstGeom prst="rect">
+            <a:avLst/>
+          </a:prstGeom>
+        </p:spPr>
+      </p:pic>
+      <p:pic>
+        <p:nvPicPr>
+          <p:cNvPr id="74" name="Imagem 73"/>
+          <p:cNvPicPr>
+            <a:picLocks noChangeAspect="1"/>
+          </p:cNvPicPr>
+          <p:nvPr/>
+        </p:nvPicPr>
+        <p:blipFill>
+          <a:blip r:embed="rId27" cstate="print">
+            <a:extLst>
+              <a:ext uri="{28A0092B-C50C-407E-A947-70E740481C1C}">
+                <a14:useLocalDpi xmlns:a14="http://schemas.microsoft.com/office/drawing/2010/main" val="0"/>
+              </a:ext>
+            </a:extLst>
+          </a:blip>
+          <a:stretch>
+            <a:fillRect/>
+          </a:stretch>
+        </p:blipFill>
+        <p:spPr>
+          <a:xfrm>
+            <a:off x="10450300" y="1127234"/>
+            <a:ext cx="733446" cy="429105"/>
+          </a:xfrm>
+          <a:prstGeom prst="rect">
+            <a:avLst/>
+          </a:prstGeom>
+        </p:spPr>
+      </p:pic>
+      <p:pic>
+        <p:nvPicPr>
+          <p:cNvPr id="75" name="Imagem 74"/>
+          <p:cNvPicPr>
+            <a:picLocks noChangeAspect="1"/>
+          </p:cNvPicPr>
+          <p:nvPr/>
+        </p:nvPicPr>
+        <p:blipFill>
+          <a:blip r:embed="rId28" cstate="print">
+            <a:extLst>
+              <a:ext uri="{28A0092B-C50C-407E-A947-70E740481C1C}">
+                <a14:useLocalDpi xmlns:a14="http://schemas.microsoft.com/office/drawing/2010/main" val="0"/>
+              </a:ext>
+            </a:extLst>
+          </a:blip>
+          <a:stretch>
+            <a:fillRect/>
+          </a:stretch>
+        </p:blipFill>
+        <p:spPr>
+          <a:xfrm>
+            <a:off x="10517299" y="1017585"/>
+            <a:ext cx="597758" cy="324782"/>
+          </a:xfrm>
+          <a:prstGeom prst="rect">
+            <a:avLst/>
+          </a:prstGeom>
+        </p:spPr>
+      </p:pic>
+      <p:pic>
+        <p:nvPicPr>
+          <p:cNvPr id="77" name="Imagem 76"/>
+          <p:cNvPicPr>
+            <a:picLocks noChangeAspect="1"/>
+          </p:cNvPicPr>
+          <p:nvPr/>
+        </p:nvPicPr>
+        <p:blipFill>
+          <a:blip r:embed="rId29" cstate="print">
+            <a:extLst>
+              <a:ext uri="{28A0092B-C50C-407E-A947-70E740481C1C}">
+                <a14:useLocalDpi xmlns:a14="http://schemas.microsoft.com/office/drawing/2010/main" val="0"/>
+              </a:ext>
+            </a:extLst>
+          </a:blip>
+          <a:stretch>
+            <a:fillRect/>
+          </a:stretch>
+        </p:blipFill>
+        <p:spPr>
+          <a:xfrm>
+            <a:off x="12656723" y="851123"/>
+            <a:ext cx="690571" cy="425565"/>
+          </a:xfrm>
+          <a:prstGeom prst="rect">
+            <a:avLst/>
+          </a:prstGeom>
+        </p:spPr>
+      </p:pic>
+      <p:pic>
+        <p:nvPicPr>
+          <p:cNvPr id="78" name="Imagem 77"/>
+          <p:cNvPicPr>
+            <a:picLocks noChangeAspect="1"/>
+          </p:cNvPicPr>
+          <p:nvPr/>
+        </p:nvPicPr>
+        <p:blipFill>
+          <a:blip r:embed="rId30" cstate="print">
+            <a:extLst>
+              <a:ext uri="{28A0092B-C50C-407E-A947-70E740481C1C}">
+                <a14:useLocalDpi xmlns:a14="http://schemas.microsoft.com/office/drawing/2010/main" val="0"/>
+              </a:ext>
+            </a:extLst>
+          </a:blip>
+          <a:stretch>
+            <a:fillRect/>
+          </a:stretch>
+        </p:blipFill>
+        <p:spPr>
+          <a:xfrm>
+            <a:off x="12750505" y="1170493"/>
+            <a:ext cx="544579" cy="208011"/>
+          </a:xfrm>
+          <a:prstGeom prst="rect">
+            <a:avLst/>
+          </a:prstGeom>
+        </p:spPr>
+      </p:pic>
+      <p:pic>
+        <p:nvPicPr>
+          <p:cNvPr id="8" name="Imagem 7"/>
+          <p:cNvPicPr>
+            <a:picLocks noChangeAspect="1"/>
+          </p:cNvPicPr>
+          <p:nvPr/>
+        </p:nvPicPr>
+        <p:blipFill>
+          <a:blip r:embed="rId31" cstate="print">
+            <a:extLst>
+              <a:ext uri="{28A0092B-C50C-407E-A947-70E740481C1C}">
+                <a14:useLocalDpi xmlns:a14="http://schemas.microsoft.com/office/drawing/2010/main" val="0"/>
+              </a:ext>
+            </a:extLst>
+          </a:blip>
+          <a:stretch>
+            <a:fillRect/>
+          </a:stretch>
+        </p:blipFill>
+        <p:spPr>
+          <a:xfrm>
+            <a:off x="13810747" y="501167"/>
+            <a:ext cx="2181190" cy="1181478"/>
+          </a:xfrm>
+          <a:prstGeom prst="rect">
+            <a:avLst/>
+          </a:prstGeom>
+        </p:spPr>
+      </p:pic>
+      <p:pic>
+        <p:nvPicPr>
+          <p:cNvPr id="7" name="Imagem 6"/>
+          <p:cNvPicPr>
+            <a:picLocks noChangeAspect="1"/>
+          </p:cNvPicPr>
+          <p:nvPr/>
+        </p:nvPicPr>
+        <p:blipFill>
+          <a:blip r:embed="rId32" cstate="print">
+            <a:extLst>
+              <a:ext uri="{28A0092B-C50C-407E-A947-70E740481C1C}">
+                <a14:useLocalDpi xmlns:a14="http://schemas.microsoft.com/office/drawing/2010/main" val="0"/>
+              </a:ext>
+            </a:extLst>
+          </a:blip>
+          <a:stretch>
+            <a:fillRect/>
+          </a:stretch>
+        </p:blipFill>
+        <p:spPr>
+          <a:xfrm>
+            <a:off x="14992083" y="855252"/>
+            <a:ext cx="976996" cy="501068"/>
+          </a:xfrm>
+          <a:prstGeom prst="rect">
+            <a:avLst/>
+          </a:prstGeom>
+        </p:spPr>
+      </p:pic>
+      <p:pic>
+        <p:nvPicPr>
+          <p:cNvPr id="9" name="Imagem 8"/>
+          <p:cNvPicPr>
+            <a:picLocks noChangeAspect="1"/>
+          </p:cNvPicPr>
+          <p:nvPr/>
+        </p:nvPicPr>
+        <p:blipFill>
+          <a:blip r:embed="rId33" cstate="print">
+            <a:extLst>
+              <a:ext uri="{28A0092B-C50C-407E-A947-70E740481C1C}">
+                <a14:useLocalDpi xmlns:a14="http://schemas.microsoft.com/office/drawing/2010/main" val="0"/>
+              </a:ext>
+            </a:extLst>
+          </a:blip>
+          <a:stretch>
+            <a:fillRect/>
+          </a:stretch>
+        </p:blipFill>
+        <p:spPr>
+          <a:xfrm>
+            <a:off x="6023146" y="9255860"/>
+            <a:ext cx="2206901" cy="819637"/>
+          </a:xfrm>
+          <a:prstGeom prst="rect">
+            <a:avLst/>
+          </a:prstGeom>
+        </p:spPr>
+      </p:pic>
     </p:spTree>
     <p:extLst>
       <p:ext uri="{BB962C8B-B14F-4D97-AF65-F5344CB8AC3E}">
@@ -9200,6 +9527,13 @@
   <p:clrMapOvr>
     <a:masterClrMapping/>
   </p:clrMapOvr>
+  <p:timing>
+    <p:tnLst>
+      <p:par>
+        <p:cTn id="1" dur="indefinite" restart="never" nodeType="tmRoot"/>
+      </p:par>
+    </p:tnLst>
+  </p:timing>
 </p:sld>
 </file>
 

</xml_diff>